<commit_message>
Projeto NexLevel + docs geral
</commit_message>
<xml_diff>
--- a/Git e Github.pptx
+++ b/Git e Github.pptx
@@ -25,6 +25,14 @@
     <p:sldId id="273" r:id="rId19"/>
     <p:sldId id="274" r:id="rId20"/>
     <p:sldId id="275" r:id="rId21"/>
+    <p:sldId id="276" r:id="rId22"/>
+    <p:sldId id="277" r:id="rId23"/>
+    <p:sldId id="278" r:id="rId24"/>
+    <p:sldId id="279" r:id="rId25"/>
+    <p:sldId id="280" r:id="rId26"/>
+    <p:sldId id="281" r:id="rId27"/>
+    <p:sldId id="282" r:id="rId28"/>
+    <p:sldId id="283" r:id="rId29"/>
   </p:sldIdLst>
   <p:sldSz cx="12192000" cy="6858000"/>
   <p:notesSz cx="6858000" cy="9144000"/>
@@ -3417,8 +3425,8 @@
         </p:blipFill>
         <p:spPr>
           <a:xfrm>
-            <a:off x="223837" y="600075"/>
-            <a:ext cx="11744325" cy="5657850"/>
+            <a:off x="0" y="0"/>
+            <a:ext cx="12192000" cy="6858000"/>
           </a:xfrm>
           <a:prstGeom prst="rect">
             <a:avLst/>
@@ -4627,8 +4635,8 @@
         </p:blipFill>
         <p:spPr>
           <a:xfrm>
-            <a:off x="762000" y="614362"/>
-            <a:ext cx="10668000" cy="5629275"/>
+            <a:off x="0" y="0"/>
+            <a:ext cx="12192000" cy="6858000"/>
           </a:xfrm>
           <a:prstGeom prst="rect">
             <a:avLst/>
@@ -4758,6 +4766,886 @@
 </p:sld>
 </file>
 
+<file path=ppt/slides/slide21.xml><?xml version="1.0" encoding="utf-8"?>
+<p:sld xmlns:a="http://schemas.openxmlformats.org/drawingml/2006/main" xmlns:r="http://schemas.openxmlformats.org/officeDocument/2006/relationships" xmlns:p="http://schemas.openxmlformats.org/presentationml/2006/main">
+  <p:cSld>
+    <p:spTree>
+      <p:nvGrpSpPr>
+        <p:cNvPr id="1" name=""/>
+        <p:cNvGrpSpPr/>
+        <p:nvPr/>
+      </p:nvGrpSpPr>
+      <p:grpSpPr>
+        <a:xfrm>
+          <a:off x="0" y="0"/>
+          <a:ext cx="0" cy="0"/>
+          <a:chOff x="0" y="0"/>
+          <a:chExt cx="0" cy="0"/>
+        </a:xfrm>
+      </p:grpSpPr>
+      <p:sp>
+        <p:nvSpPr>
+          <p:cNvPr id="2" name="Título 1">
+            <a:extLst>
+              <a:ext uri="{FF2B5EF4-FFF2-40B4-BE49-F238E27FC236}">
+                <a16:creationId xmlns:a16="http://schemas.microsoft.com/office/drawing/2014/main" id="{2A0E0E65-BAE1-4692-8078-E42CABF8F598}"/>
+              </a:ext>
+            </a:extLst>
+          </p:cNvPr>
+          <p:cNvSpPr>
+            <a:spLocks noGrp="1"/>
+          </p:cNvSpPr>
+          <p:nvPr>
+            <p:ph type="title"/>
+          </p:nvPr>
+        </p:nvSpPr>
+        <p:spPr/>
+        <p:txBody>
+          <a:bodyPr/>
+          <a:lstStyle/>
+          <a:p>
+            <a:endParaRPr lang="pt-BR"/>
+          </a:p>
+        </p:txBody>
+      </p:sp>
+      <p:sp>
+        <p:nvSpPr>
+          <p:cNvPr id="3" name="Espaço Reservado para Conteúdo 2">
+            <a:extLst>
+              <a:ext uri="{FF2B5EF4-FFF2-40B4-BE49-F238E27FC236}">
+                <a16:creationId xmlns:a16="http://schemas.microsoft.com/office/drawing/2014/main" id="{380B3816-812F-4032-8B7F-B271715F66BC}"/>
+              </a:ext>
+            </a:extLst>
+          </p:cNvPr>
+          <p:cNvSpPr>
+            <a:spLocks noGrp="1"/>
+          </p:cNvSpPr>
+          <p:nvPr>
+            <p:ph idx="1"/>
+          </p:nvPr>
+        </p:nvSpPr>
+        <p:spPr/>
+        <p:txBody>
+          <a:bodyPr/>
+          <a:lstStyle/>
+          <a:p>
+            <a:endParaRPr lang="pt-BR"/>
+          </a:p>
+        </p:txBody>
+      </p:sp>
+      <p:pic>
+        <p:nvPicPr>
+          <p:cNvPr id="4" name="Imagem 3">
+            <a:extLst>
+              <a:ext uri="{FF2B5EF4-FFF2-40B4-BE49-F238E27FC236}">
+                <a16:creationId xmlns:a16="http://schemas.microsoft.com/office/drawing/2014/main" id="{8D9DE99B-6BEC-4C9D-AB15-F715242225ED}"/>
+              </a:ext>
+            </a:extLst>
+          </p:cNvPr>
+          <p:cNvPicPr>
+            <a:picLocks noChangeAspect="1"/>
+          </p:cNvPicPr>
+          <p:nvPr/>
+        </p:nvPicPr>
+        <p:blipFill>
+          <a:blip r:embed="rId2"/>
+          <a:stretch>
+            <a:fillRect/>
+          </a:stretch>
+        </p:blipFill>
+        <p:spPr>
+          <a:xfrm>
+            <a:off x="1466850" y="590550"/>
+            <a:ext cx="9258300" cy="5676900"/>
+          </a:xfrm>
+          <a:prstGeom prst="rect">
+            <a:avLst/>
+          </a:prstGeom>
+        </p:spPr>
+      </p:pic>
+    </p:spTree>
+    <p:extLst>
+      <p:ext uri="{BB962C8B-B14F-4D97-AF65-F5344CB8AC3E}">
+        <p14:creationId xmlns:p14="http://schemas.microsoft.com/office/powerpoint/2010/main" val="769961767"/>
+      </p:ext>
+    </p:extLst>
+  </p:cSld>
+  <p:clrMapOvr>
+    <a:masterClrMapping/>
+  </p:clrMapOvr>
+</p:sld>
+</file>
+
+<file path=ppt/slides/slide22.xml><?xml version="1.0" encoding="utf-8"?>
+<p:sld xmlns:a="http://schemas.openxmlformats.org/drawingml/2006/main" xmlns:r="http://schemas.openxmlformats.org/officeDocument/2006/relationships" xmlns:p="http://schemas.openxmlformats.org/presentationml/2006/main">
+  <p:cSld>
+    <p:spTree>
+      <p:nvGrpSpPr>
+        <p:cNvPr id="1" name=""/>
+        <p:cNvGrpSpPr/>
+        <p:nvPr/>
+      </p:nvGrpSpPr>
+      <p:grpSpPr>
+        <a:xfrm>
+          <a:off x="0" y="0"/>
+          <a:ext cx="0" cy="0"/>
+          <a:chOff x="0" y="0"/>
+          <a:chExt cx="0" cy="0"/>
+        </a:xfrm>
+      </p:grpSpPr>
+      <p:sp>
+        <p:nvSpPr>
+          <p:cNvPr id="2" name="Título 1">
+            <a:extLst>
+              <a:ext uri="{FF2B5EF4-FFF2-40B4-BE49-F238E27FC236}">
+                <a16:creationId xmlns:a16="http://schemas.microsoft.com/office/drawing/2014/main" id="{5A40FE15-D5E1-4DA5-9EB0-6B7399DA744B}"/>
+              </a:ext>
+            </a:extLst>
+          </p:cNvPr>
+          <p:cNvSpPr>
+            <a:spLocks noGrp="1"/>
+          </p:cNvSpPr>
+          <p:nvPr>
+            <p:ph type="title"/>
+          </p:nvPr>
+        </p:nvSpPr>
+        <p:spPr/>
+        <p:txBody>
+          <a:bodyPr/>
+          <a:lstStyle/>
+          <a:p>
+            <a:endParaRPr lang="pt-BR"/>
+          </a:p>
+        </p:txBody>
+      </p:sp>
+      <p:sp>
+        <p:nvSpPr>
+          <p:cNvPr id="3" name="Espaço Reservado para Conteúdo 2">
+            <a:extLst>
+              <a:ext uri="{FF2B5EF4-FFF2-40B4-BE49-F238E27FC236}">
+                <a16:creationId xmlns:a16="http://schemas.microsoft.com/office/drawing/2014/main" id="{28DEBC7B-4AE1-41DA-99F5-64052861ACF8}"/>
+              </a:ext>
+            </a:extLst>
+          </p:cNvPr>
+          <p:cNvSpPr>
+            <a:spLocks noGrp="1"/>
+          </p:cNvSpPr>
+          <p:nvPr>
+            <p:ph idx="1"/>
+          </p:nvPr>
+        </p:nvSpPr>
+        <p:spPr/>
+        <p:txBody>
+          <a:bodyPr/>
+          <a:lstStyle/>
+          <a:p>
+            <a:endParaRPr lang="pt-BR"/>
+          </a:p>
+        </p:txBody>
+      </p:sp>
+      <p:pic>
+        <p:nvPicPr>
+          <p:cNvPr id="4" name="Imagem 3">
+            <a:extLst>
+              <a:ext uri="{FF2B5EF4-FFF2-40B4-BE49-F238E27FC236}">
+                <a16:creationId xmlns:a16="http://schemas.microsoft.com/office/drawing/2014/main" id="{4CEA1E7E-004C-4A17-8F05-F951A77DA303}"/>
+              </a:ext>
+            </a:extLst>
+          </p:cNvPr>
+          <p:cNvPicPr>
+            <a:picLocks noChangeAspect="1"/>
+          </p:cNvPicPr>
+          <p:nvPr/>
+        </p:nvPicPr>
+        <p:blipFill>
+          <a:blip r:embed="rId2"/>
+          <a:stretch>
+            <a:fillRect/>
+          </a:stretch>
+        </p:blipFill>
+        <p:spPr>
+          <a:xfrm>
+            <a:off x="1057275" y="790575"/>
+            <a:ext cx="10077450" cy="5276850"/>
+          </a:xfrm>
+          <a:prstGeom prst="rect">
+            <a:avLst/>
+          </a:prstGeom>
+        </p:spPr>
+      </p:pic>
+    </p:spTree>
+    <p:extLst>
+      <p:ext uri="{BB962C8B-B14F-4D97-AF65-F5344CB8AC3E}">
+        <p14:creationId xmlns:p14="http://schemas.microsoft.com/office/powerpoint/2010/main" val="2800367294"/>
+      </p:ext>
+    </p:extLst>
+  </p:cSld>
+  <p:clrMapOvr>
+    <a:masterClrMapping/>
+  </p:clrMapOvr>
+</p:sld>
+</file>
+
+<file path=ppt/slides/slide23.xml><?xml version="1.0" encoding="utf-8"?>
+<p:sld xmlns:a="http://schemas.openxmlformats.org/drawingml/2006/main" xmlns:r="http://schemas.openxmlformats.org/officeDocument/2006/relationships" xmlns:p="http://schemas.openxmlformats.org/presentationml/2006/main">
+  <p:cSld>
+    <p:spTree>
+      <p:nvGrpSpPr>
+        <p:cNvPr id="1" name=""/>
+        <p:cNvGrpSpPr/>
+        <p:nvPr/>
+      </p:nvGrpSpPr>
+      <p:grpSpPr>
+        <a:xfrm>
+          <a:off x="0" y="0"/>
+          <a:ext cx="0" cy="0"/>
+          <a:chOff x="0" y="0"/>
+          <a:chExt cx="0" cy="0"/>
+        </a:xfrm>
+      </p:grpSpPr>
+      <p:sp>
+        <p:nvSpPr>
+          <p:cNvPr id="2" name="Título 1">
+            <a:extLst>
+              <a:ext uri="{FF2B5EF4-FFF2-40B4-BE49-F238E27FC236}">
+                <a16:creationId xmlns:a16="http://schemas.microsoft.com/office/drawing/2014/main" id="{806A77AB-C772-4AF7-A1AD-82B7A2FAF559}"/>
+              </a:ext>
+            </a:extLst>
+          </p:cNvPr>
+          <p:cNvSpPr>
+            <a:spLocks noGrp="1"/>
+          </p:cNvSpPr>
+          <p:nvPr>
+            <p:ph type="title"/>
+          </p:nvPr>
+        </p:nvSpPr>
+        <p:spPr/>
+        <p:txBody>
+          <a:bodyPr/>
+          <a:lstStyle/>
+          <a:p>
+            <a:endParaRPr lang="pt-BR"/>
+          </a:p>
+        </p:txBody>
+      </p:sp>
+      <p:sp>
+        <p:nvSpPr>
+          <p:cNvPr id="3" name="Espaço Reservado para Conteúdo 2">
+            <a:extLst>
+              <a:ext uri="{FF2B5EF4-FFF2-40B4-BE49-F238E27FC236}">
+                <a16:creationId xmlns:a16="http://schemas.microsoft.com/office/drawing/2014/main" id="{FA97E464-057B-4BA3-836D-C3D1213A5B32}"/>
+              </a:ext>
+            </a:extLst>
+          </p:cNvPr>
+          <p:cNvSpPr>
+            <a:spLocks noGrp="1"/>
+          </p:cNvSpPr>
+          <p:nvPr>
+            <p:ph idx="1"/>
+          </p:nvPr>
+        </p:nvSpPr>
+        <p:spPr/>
+        <p:txBody>
+          <a:bodyPr/>
+          <a:lstStyle/>
+          <a:p>
+            <a:endParaRPr lang="pt-BR"/>
+          </a:p>
+        </p:txBody>
+      </p:sp>
+      <p:pic>
+        <p:nvPicPr>
+          <p:cNvPr id="4" name="Imagem 3">
+            <a:extLst>
+              <a:ext uri="{FF2B5EF4-FFF2-40B4-BE49-F238E27FC236}">
+                <a16:creationId xmlns:a16="http://schemas.microsoft.com/office/drawing/2014/main" id="{0B3D3A1E-E313-4997-944C-488DFEFA33EF}"/>
+              </a:ext>
+            </a:extLst>
+          </p:cNvPr>
+          <p:cNvPicPr>
+            <a:picLocks noChangeAspect="1"/>
+          </p:cNvPicPr>
+          <p:nvPr/>
+        </p:nvPicPr>
+        <p:blipFill>
+          <a:blip r:embed="rId2"/>
+          <a:stretch>
+            <a:fillRect/>
+          </a:stretch>
+        </p:blipFill>
+        <p:spPr>
+          <a:xfrm>
+            <a:off x="1457325" y="552450"/>
+            <a:ext cx="9277350" cy="5753100"/>
+          </a:xfrm>
+          <a:prstGeom prst="rect">
+            <a:avLst/>
+          </a:prstGeom>
+        </p:spPr>
+      </p:pic>
+    </p:spTree>
+    <p:extLst>
+      <p:ext uri="{BB962C8B-B14F-4D97-AF65-F5344CB8AC3E}">
+        <p14:creationId xmlns:p14="http://schemas.microsoft.com/office/powerpoint/2010/main" val="404372270"/>
+      </p:ext>
+    </p:extLst>
+  </p:cSld>
+  <p:clrMapOvr>
+    <a:masterClrMapping/>
+  </p:clrMapOvr>
+</p:sld>
+</file>
+
+<file path=ppt/slides/slide24.xml><?xml version="1.0" encoding="utf-8"?>
+<p:sld xmlns:a="http://schemas.openxmlformats.org/drawingml/2006/main" xmlns:r="http://schemas.openxmlformats.org/officeDocument/2006/relationships" xmlns:p="http://schemas.openxmlformats.org/presentationml/2006/main">
+  <p:cSld>
+    <p:spTree>
+      <p:nvGrpSpPr>
+        <p:cNvPr id="1" name=""/>
+        <p:cNvGrpSpPr/>
+        <p:nvPr/>
+      </p:nvGrpSpPr>
+      <p:grpSpPr>
+        <a:xfrm>
+          <a:off x="0" y="0"/>
+          <a:ext cx="0" cy="0"/>
+          <a:chOff x="0" y="0"/>
+          <a:chExt cx="0" cy="0"/>
+        </a:xfrm>
+      </p:grpSpPr>
+      <p:sp>
+        <p:nvSpPr>
+          <p:cNvPr id="2" name="Título 1">
+            <a:extLst>
+              <a:ext uri="{FF2B5EF4-FFF2-40B4-BE49-F238E27FC236}">
+                <a16:creationId xmlns:a16="http://schemas.microsoft.com/office/drawing/2014/main" id="{72EC00F6-69AF-4BC1-8C2C-6FAE699804D0}"/>
+              </a:ext>
+            </a:extLst>
+          </p:cNvPr>
+          <p:cNvSpPr>
+            <a:spLocks noGrp="1"/>
+          </p:cNvSpPr>
+          <p:nvPr>
+            <p:ph type="title"/>
+          </p:nvPr>
+        </p:nvSpPr>
+        <p:spPr/>
+        <p:txBody>
+          <a:bodyPr/>
+          <a:lstStyle/>
+          <a:p>
+            <a:endParaRPr lang="pt-BR"/>
+          </a:p>
+        </p:txBody>
+      </p:sp>
+      <p:sp>
+        <p:nvSpPr>
+          <p:cNvPr id="3" name="Espaço Reservado para Conteúdo 2">
+            <a:extLst>
+              <a:ext uri="{FF2B5EF4-FFF2-40B4-BE49-F238E27FC236}">
+                <a16:creationId xmlns:a16="http://schemas.microsoft.com/office/drawing/2014/main" id="{96DDFC4D-F6D8-45C9-904F-BED6304FE423}"/>
+              </a:ext>
+            </a:extLst>
+          </p:cNvPr>
+          <p:cNvSpPr>
+            <a:spLocks noGrp="1"/>
+          </p:cNvSpPr>
+          <p:nvPr>
+            <p:ph idx="1"/>
+          </p:nvPr>
+        </p:nvSpPr>
+        <p:spPr/>
+        <p:txBody>
+          <a:bodyPr/>
+          <a:lstStyle/>
+          <a:p>
+            <a:endParaRPr lang="pt-BR"/>
+          </a:p>
+        </p:txBody>
+      </p:sp>
+      <p:pic>
+        <p:nvPicPr>
+          <p:cNvPr id="4" name="Imagem 3">
+            <a:extLst>
+              <a:ext uri="{FF2B5EF4-FFF2-40B4-BE49-F238E27FC236}">
+                <a16:creationId xmlns:a16="http://schemas.microsoft.com/office/drawing/2014/main" id="{BBCB1343-93FD-4A0D-8AD3-0E7C42172592}"/>
+              </a:ext>
+            </a:extLst>
+          </p:cNvPr>
+          <p:cNvPicPr>
+            <a:picLocks noChangeAspect="1"/>
+          </p:cNvPicPr>
+          <p:nvPr/>
+        </p:nvPicPr>
+        <p:blipFill>
+          <a:blip r:embed="rId2"/>
+          <a:stretch>
+            <a:fillRect/>
+          </a:stretch>
+        </p:blipFill>
+        <p:spPr>
+          <a:xfrm>
+            <a:off x="1914525" y="566737"/>
+            <a:ext cx="8362950" cy="5724525"/>
+          </a:xfrm>
+          <a:prstGeom prst="rect">
+            <a:avLst/>
+          </a:prstGeom>
+        </p:spPr>
+      </p:pic>
+    </p:spTree>
+    <p:extLst>
+      <p:ext uri="{BB962C8B-B14F-4D97-AF65-F5344CB8AC3E}">
+        <p14:creationId xmlns:p14="http://schemas.microsoft.com/office/powerpoint/2010/main" val="2450261866"/>
+      </p:ext>
+    </p:extLst>
+  </p:cSld>
+  <p:clrMapOvr>
+    <a:masterClrMapping/>
+  </p:clrMapOvr>
+</p:sld>
+</file>
+
+<file path=ppt/slides/slide25.xml><?xml version="1.0" encoding="utf-8"?>
+<p:sld xmlns:a="http://schemas.openxmlformats.org/drawingml/2006/main" xmlns:r="http://schemas.openxmlformats.org/officeDocument/2006/relationships" xmlns:p="http://schemas.openxmlformats.org/presentationml/2006/main">
+  <p:cSld>
+    <p:spTree>
+      <p:nvGrpSpPr>
+        <p:cNvPr id="1" name=""/>
+        <p:cNvGrpSpPr/>
+        <p:nvPr/>
+      </p:nvGrpSpPr>
+      <p:grpSpPr>
+        <a:xfrm>
+          <a:off x="0" y="0"/>
+          <a:ext cx="0" cy="0"/>
+          <a:chOff x="0" y="0"/>
+          <a:chExt cx="0" cy="0"/>
+        </a:xfrm>
+      </p:grpSpPr>
+      <p:sp>
+        <p:nvSpPr>
+          <p:cNvPr id="2" name="Título 1">
+            <a:extLst>
+              <a:ext uri="{FF2B5EF4-FFF2-40B4-BE49-F238E27FC236}">
+                <a16:creationId xmlns:a16="http://schemas.microsoft.com/office/drawing/2014/main" id="{06F5ADD5-15C4-44F2-9677-4F93A7C880B5}"/>
+              </a:ext>
+            </a:extLst>
+          </p:cNvPr>
+          <p:cNvSpPr>
+            <a:spLocks noGrp="1"/>
+          </p:cNvSpPr>
+          <p:nvPr>
+            <p:ph type="title"/>
+          </p:nvPr>
+        </p:nvSpPr>
+        <p:spPr/>
+        <p:txBody>
+          <a:bodyPr/>
+          <a:lstStyle/>
+          <a:p>
+            <a:endParaRPr lang="pt-BR"/>
+          </a:p>
+        </p:txBody>
+      </p:sp>
+      <p:sp>
+        <p:nvSpPr>
+          <p:cNvPr id="3" name="Espaço Reservado para Conteúdo 2">
+            <a:extLst>
+              <a:ext uri="{FF2B5EF4-FFF2-40B4-BE49-F238E27FC236}">
+                <a16:creationId xmlns:a16="http://schemas.microsoft.com/office/drawing/2014/main" id="{07369B3B-1C87-4B0F-8B6C-0D74897AA70C}"/>
+              </a:ext>
+            </a:extLst>
+          </p:cNvPr>
+          <p:cNvSpPr>
+            <a:spLocks noGrp="1"/>
+          </p:cNvSpPr>
+          <p:nvPr>
+            <p:ph idx="1"/>
+          </p:nvPr>
+        </p:nvSpPr>
+        <p:spPr/>
+        <p:txBody>
+          <a:bodyPr/>
+          <a:lstStyle/>
+          <a:p>
+            <a:endParaRPr lang="pt-BR"/>
+          </a:p>
+        </p:txBody>
+      </p:sp>
+      <p:pic>
+        <p:nvPicPr>
+          <p:cNvPr id="4" name="Imagem 3">
+            <a:extLst>
+              <a:ext uri="{FF2B5EF4-FFF2-40B4-BE49-F238E27FC236}">
+                <a16:creationId xmlns:a16="http://schemas.microsoft.com/office/drawing/2014/main" id="{01519BC2-D7CC-4E52-AC14-568129ADE55C}"/>
+              </a:ext>
+            </a:extLst>
+          </p:cNvPr>
+          <p:cNvPicPr>
+            <a:picLocks noChangeAspect="1"/>
+          </p:cNvPicPr>
+          <p:nvPr/>
+        </p:nvPicPr>
+        <p:blipFill>
+          <a:blip r:embed="rId2"/>
+          <a:stretch>
+            <a:fillRect/>
+          </a:stretch>
+        </p:blipFill>
+        <p:spPr>
+          <a:xfrm>
+            <a:off x="866775" y="1085850"/>
+            <a:ext cx="10458450" cy="4686300"/>
+          </a:xfrm>
+          <a:prstGeom prst="rect">
+            <a:avLst/>
+          </a:prstGeom>
+        </p:spPr>
+      </p:pic>
+    </p:spTree>
+    <p:extLst>
+      <p:ext uri="{BB962C8B-B14F-4D97-AF65-F5344CB8AC3E}">
+        <p14:creationId xmlns:p14="http://schemas.microsoft.com/office/powerpoint/2010/main" val="3341733320"/>
+      </p:ext>
+    </p:extLst>
+  </p:cSld>
+  <p:clrMapOvr>
+    <a:masterClrMapping/>
+  </p:clrMapOvr>
+</p:sld>
+</file>
+
+<file path=ppt/slides/slide26.xml><?xml version="1.0" encoding="utf-8"?>
+<p:sld xmlns:a="http://schemas.openxmlformats.org/drawingml/2006/main" xmlns:r="http://schemas.openxmlformats.org/officeDocument/2006/relationships" xmlns:p="http://schemas.openxmlformats.org/presentationml/2006/main">
+  <p:cSld>
+    <p:spTree>
+      <p:nvGrpSpPr>
+        <p:cNvPr id="1" name=""/>
+        <p:cNvGrpSpPr/>
+        <p:nvPr/>
+      </p:nvGrpSpPr>
+      <p:grpSpPr>
+        <a:xfrm>
+          <a:off x="0" y="0"/>
+          <a:ext cx="0" cy="0"/>
+          <a:chOff x="0" y="0"/>
+          <a:chExt cx="0" cy="0"/>
+        </a:xfrm>
+      </p:grpSpPr>
+      <p:sp>
+        <p:nvSpPr>
+          <p:cNvPr id="2" name="Título 1">
+            <a:extLst>
+              <a:ext uri="{FF2B5EF4-FFF2-40B4-BE49-F238E27FC236}">
+                <a16:creationId xmlns:a16="http://schemas.microsoft.com/office/drawing/2014/main" id="{005E5FF2-2274-463B-9945-75AD6D9CE20B}"/>
+              </a:ext>
+            </a:extLst>
+          </p:cNvPr>
+          <p:cNvSpPr>
+            <a:spLocks noGrp="1"/>
+          </p:cNvSpPr>
+          <p:nvPr>
+            <p:ph type="title"/>
+          </p:nvPr>
+        </p:nvSpPr>
+        <p:spPr/>
+        <p:txBody>
+          <a:bodyPr/>
+          <a:lstStyle/>
+          <a:p>
+            <a:endParaRPr lang="pt-BR"/>
+          </a:p>
+        </p:txBody>
+      </p:sp>
+      <p:sp>
+        <p:nvSpPr>
+          <p:cNvPr id="3" name="Espaço Reservado para Conteúdo 2">
+            <a:extLst>
+              <a:ext uri="{FF2B5EF4-FFF2-40B4-BE49-F238E27FC236}">
+                <a16:creationId xmlns:a16="http://schemas.microsoft.com/office/drawing/2014/main" id="{0C10E155-7C4D-4F0B-B24E-AD99267FC2EE}"/>
+              </a:ext>
+            </a:extLst>
+          </p:cNvPr>
+          <p:cNvSpPr>
+            <a:spLocks noGrp="1"/>
+          </p:cNvSpPr>
+          <p:nvPr>
+            <p:ph idx="1"/>
+          </p:nvPr>
+        </p:nvSpPr>
+        <p:spPr/>
+        <p:txBody>
+          <a:bodyPr/>
+          <a:lstStyle/>
+          <a:p>
+            <a:endParaRPr lang="pt-BR"/>
+          </a:p>
+        </p:txBody>
+      </p:sp>
+      <p:pic>
+        <p:nvPicPr>
+          <p:cNvPr id="4" name="Imagem 3">
+            <a:extLst>
+              <a:ext uri="{FF2B5EF4-FFF2-40B4-BE49-F238E27FC236}">
+                <a16:creationId xmlns:a16="http://schemas.microsoft.com/office/drawing/2014/main" id="{84B1A9B9-C791-4AEA-B83C-5CDD172B1073}"/>
+              </a:ext>
+            </a:extLst>
+          </p:cNvPr>
+          <p:cNvPicPr>
+            <a:picLocks noChangeAspect="1"/>
+          </p:cNvPicPr>
+          <p:nvPr/>
+        </p:nvPicPr>
+        <p:blipFill>
+          <a:blip r:embed="rId2"/>
+          <a:stretch>
+            <a:fillRect/>
+          </a:stretch>
+        </p:blipFill>
+        <p:spPr>
+          <a:xfrm>
+            <a:off x="1319212" y="547687"/>
+            <a:ext cx="9553575" cy="5762625"/>
+          </a:xfrm>
+          <a:prstGeom prst="rect">
+            <a:avLst/>
+          </a:prstGeom>
+        </p:spPr>
+      </p:pic>
+    </p:spTree>
+    <p:extLst>
+      <p:ext uri="{BB962C8B-B14F-4D97-AF65-F5344CB8AC3E}">
+        <p14:creationId xmlns:p14="http://schemas.microsoft.com/office/powerpoint/2010/main" val="2245358834"/>
+      </p:ext>
+    </p:extLst>
+  </p:cSld>
+  <p:clrMapOvr>
+    <a:masterClrMapping/>
+  </p:clrMapOvr>
+</p:sld>
+</file>
+
+<file path=ppt/slides/slide27.xml><?xml version="1.0" encoding="utf-8"?>
+<p:sld xmlns:a="http://schemas.openxmlformats.org/drawingml/2006/main" xmlns:r="http://schemas.openxmlformats.org/officeDocument/2006/relationships" xmlns:p="http://schemas.openxmlformats.org/presentationml/2006/main">
+  <p:cSld>
+    <p:spTree>
+      <p:nvGrpSpPr>
+        <p:cNvPr id="1" name=""/>
+        <p:cNvGrpSpPr/>
+        <p:nvPr/>
+      </p:nvGrpSpPr>
+      <p:grpSpPr>
+        <a:xfrm>
+          <a:off x="0" y="0"/>
+          <a:ext cx="0" cy="0"/>
+          <a:chOff x="0" y="0"/>
+          <a:chExt cx="0" cy="0"/>
+        </a:xfrm>
+      </p:grpSpPr>
+      <p:sp>
+        <p:nvSpPr>
+          <p:cNvPr id="2" name="Título 1">
+            <a:extLst>
+              <a:ext uri="{FF2B5EF4-FFF2-40B4-BE49-F238E27FC236}">
+                <a16:creationId xmlns:a16="http://schemas.microsoft.com/office/drawing/2014/main" id="{DCBF4F4E-7D43-4967-B4EB-FA7F6A9A47A2}"/>
+              </a:ext>
+            </a:extLst>
+          </p:cNvPr>
+          <p:cNvSpPr>
+            <a:spLocks noGrp="1"/>
+          </p:cNvSpPr>
+          <p:nvPr>
+            <p:ph type="title"/>
+          </p:nvPr>
+        </p:nvSpPr>
+        <p:spPr/>
+        <p:txBody>
+          <a:bodyPr/>
+          <a:lstStyle/>
+          <a:p>
+            <a:endParaRPr lang="pt-BR"/>
+          </a:p>
+        </p:txBody>
+      </p:sp>
+      <p:sp>
+        <p:nvSpPr>
+          <p:cNvPr id="3" name="Espaço Reservado para Conteúdo 2">
+            <a:extLst>
+              <a:ext uri="{FF2B5EF4-FFF2-40B4-BE49-F238E27FC236}">
+                <a16:creationId xmlns:a16="http://schemas.microsoft.com/office/drawing/2014/main" id="{390675E1-17DA-421B-A446-C89AE0AFFC9D}"/>
+              </a:ext>
+            </a:extLst>
+          </p:cNvPr>
+          <p:cNvSpPr>
+            <a:spLocks noGrp="1"/>
+          </p:cNvSpPr>
+          <p:nvPr>
+            <p:ph idx="1"/>
+          </p:nvPr>
+        </p:nvSpPr>
+        <p:spPr/>
+        <p:txBody>
+          <a:bodyPr/>
+          <a:lstStyle/>
+          <a:p>
+            <a:endParaRPr lang="pt-BR"/>
+          </a:p>
+        </p:txBody>
+      </p:sp>
+      <p:pic>
+        <p:nvPicPr>
+          <p:cNvPr id="4" name="Imagem 3">
+            <a:extLst>
+              <a:ext uri="{FF2B5EF4-FFF2-40B4-BE49-F238E27FC236}">
+                <a16:creationId xmlns:a16="http://schemas.microsoft.com/office/drawing/2014/main" id="{A4D5FB9C-DDD5-4A5F-BC7D-82059F28BE01}"/>
+              </a:ext>
+            </a:extLst>
+          </p:cNvPr>
+          <p:cNvPicPr>
+            <a:picLocks noChangeAspect="1"/>
+          </p:cNvPicPr>
+          <p:nvPr/>
+        </p:nvPicPr>
+        <p:blipFill>
+          <a:blip r:embed="rId2"/>
+          <a:stretch>
+            <a:fillRect/>
+          </a:stretch>
+        </p:blipFill>
+        <p:spPr>
+          <a:xfrm>
+            <a:off x="928687" y="733425"/>
+            <a:ext cx="10334625" cy="5391150"/>
+          </a:xfrm>
+          <a:prstGeom prst="rect">
+            <a:avLst/>
+          </a:prstGeom>
+        </p:spPr>
+      </p:pic>
+    </p:spTree>
+    <p:extLst>
+      <p:ext uri="{BB962C8B-B14F-4D97-AF65-F5344CB8AC3E}">
+        <p14:creationId xmlns:p14="http://schemas.microsoft.com/office/powerpoint/2010/main" val="1657082526"/>
+      </p:ext>
+    </p:extLst>
+  </p:cSld>
+  <p:clrMapOvr>
+    <a:masterClrMapping/>
+  </p:clrMapOvr>
+</p:sld>
+</file>
+
+<file path=ppt/slides/slide28.xml><?xml version="1.0" encoding="utf-8"?>
+<p:sld xmlns:a="http://schemas.openxmlformats.org/drawingml/2006/main" xmlns:r="http://schemas.openxmlformats.org/officeDocument/2006/relationships" xmlns:p="http://schemas.openxmlformats.org/presentationml/2006/main">
+  <p:cSld>
+    <p:spTree>
+      <p:nvGrpSpPr>
+        <p:cNvPr id="1" name=""/>
+        <p:cNvGrpSpPr/>
+        <p:nvPr/>
+      </p:nvGrpSpPr>
+      <p:grpSpPr>
+        <a:xfrm>
+          <a:off x="0" y="0"/>
+          <a:ext cx="0" cy="0"/>
+          <a:chOff x="0" y="0"/>
+          <a:chExt cx="0" cy="0"/>
+        </a:xfrm>
+      </p:grpSpPr>
+      <p:sp>
+        <p:nvSpPr>
+          <p:cNvPr id="2" name="Título 1">
+            <a:extLst>
+              <a:ext uri="{FF2B5EF4-FFF2-40B4-BE49-F238E27FC236}">
+                <a16:creationId xmlns:a16="http://schemas.microsoft.com/office/drawing/2014/main" id="{3381956B-156D-4B17-9E3B-4D3A9116D5CB}"/>
+              </a:ext>
+            </a:extLst>
+          </p:cNvPr>
+          <p:cNvSpPr>
+            <a:spLocks noGrp="1"/>
+          </p:cNvSpPr>
+          <p:nvPr>
+            <p:ph type="title"/>
+          </p:nvPr>
+        </p:nvSpPr>
+        <p:spPr/>
+        <p:txBody>
+          <a:bodyPr/>
+          <a:lstStyle/>
+          <a:p>
+            <a:endParaRPr lang="pt-BR"/>
+          </a:p>
+        </p:txBody>
+      </p:sp>
+      <p:sp>
+        <p:nvSpPr>
+          <p:cNvPr id="3" name="Espaço Reservado para Conteúdo 2">
+            <a:extLst>
+              <a:ext uri="{FF2B5EF4-FFF2-40B4-BE49-F238E27FC236}">
+                <a16:creationId xmlns:a16="http://schemas.microsoft.com/office/drawing/2014/main" id="{8FFA842A-A0D0-4245-9F3D-D1D1D32F8F0D}"/>
+              </a:ext>
+            </a:extLst>
+          </p:cNvPr>
+          <p:cNvSpPr>
+            <a:spLocks noGrp="1"/>
+          </p:cNvSpPr>
+          <p:nvPr>
+            <p:ph idx="1"/>
+          </p:nvPr>
+        </p:nvSpPr>
+        <p:spPr/>
+        <p:txBody>
+          <a:bodyPr/>
+          <a:lstStyle/>
+          <a:p>
+            <a:endParaRPr lang="pt-BR"/>
+          </a:p>
+        </p:txBody>
+      </p:sp>
+      <p:pic>
+        <p:nvPicPr>
+          <p:cNvPr id="4" name="Imagem 3">
+            <a:extLst>
+              <a:ext uri="{FF2B5EF4-FFF2-40B4-BE49-F238E27FC236}">
+                <a16:creationId xmlns:a16="http://schemas.microsoft.com/office/drawing/2014/main" id="{8F46F6B6-2644-49AF-BD44-0D34031715F0}"/>
+              </a:ext>
+            </a:extLst>
+          </p:cNvPr>
+          <p:cNvPicPr>
+            <a:picLocks noChangeAspect="1"/>
+          </p:cNvPicPr>
+          <p:nvPr/>
+        </p:nvPicPr>
+        <p:blipFill>
+          <a:blip r:embed="rId2"/>
+          <a:stretch>
+            <a:fillRect/>
+          </a:stretch>
+        </p:blipFill>
+        <p:spPr>
+          <a:xfrm>
+            <a:off x="1066800" y="571500"/>
+            <a:ext cx="10058400" cy="5715000"/>
+          </a:xfrm>
+          <a:prstGeom prst="rect">
+            <a:avLst/>
+          </a:prstGeom>
+        </p:spPr>
+      </p:pic>
+    </p:spTree>
+    <p:extLst>
+      <p:ext uri="{BB962C8B-B14F-4D97-AF65-F5344CB8AC3E}">
+        <p14:creationId xmlns:p14="http://schemas.microsoft.com/office/powerpoint/2010/main" val="3620459031"/>
+      </p:ext>
+    </p:extLst>
+  </p:cSld>
+  <p:clrMapOvr>
+    <a:masterClrMapping/>
+  </p:clrMapOvr>
+</p:sld>
+</file>
+
 <file path=ppt/slides/slide3.xml><?xml version="1.0" encoding="utf-8"?>
 <p:sld xmlns:a="http://schemas.openxmlformats.org/drawingml/2006/main" xmlns:r="http://schemas.openxmlformats.org/officeDocument/2006/relationships" xmlns:p="http://schemas.openxmlformats.org/presentationml/2006/main">
   <p:cSld>
@@ -4847,8 +5735,8 @@
         </p:blipFill>
         <p:spPr>
           <a:xfrm>
-            <a:off x="766762" y="628650"/>
-            <a:ext cx="10658475" cy="5600700"/>
+            <a:off x="0" y="0"/>
+            <a:ext cx="12192000" cy="6858000"/>
           </a:xfrm>
           <a:prstGeom prst="rect">
             <a:avLst/>
@@ -4957,8 +5845,8 @@
         </p:blipFill>
         <p:spPr>
           <a:xfrm>
-            <a:off x="652462" y="571500"/>
-            <a:ext cx="10887075" cy="5715000"/>
+            <a:off x="0" y="0"/>
+            <a:ext cx="12192000" cy="6858000"/>
           </a:xfrm>
           <a:prstGeom prst="rect">
             <a:avLst/>
@@ -5067,8 +5955,8 @@
         </p:blipFill>
         <p:spPr>
           <a:xfrm>
-            <a:off x="709612" y="566737"/>
-            <a:ext cx="10772775" cy="5724525"/>
+            <a:off x="0" y="0"/>
+            <a:ext cx="12192000" cy="6858000"/>
           </a:xfrm>
           <a:prstGeom prst="rect">
             <a:avLst/>
@@ -5177,8 +6065,8 @@
         </p:blipFill>
         <p:spPr>
           <a:xfrm>
-            <a:off x="276225" y="828675"/>
-            <a:ext cx="11639550" cy="5200650"/>
+            <a:off x="0" y="0"/>
+            <a:ext cx="12192000" cy="6858000"/>
           </a:xfrm>
           <a:prstGeom prst="rect">
             <a:avLst/>
@@ -5321,8 +6209,8 @@
         </p:blipFill>
         <p:spPr>
           <a:xfrm>
-            <a:off x="885825" y="800100"/>
-            <a:ext cx="10420350" cy="5257800"/>
+            <a:off x="0" y="0"/>
+            <a:ext cx="12192000" cy="6858000"/>
           </a:xfrm>
           <a:prstGeom prst="rect">
             <a:avLst/>
@@ -5431,8 +6319,8 @@
         </p:blipFill>
         <p:spPr>
           <a:xfrm>
-            <a:off x="1081087" y="881062"/>
-            <a:ext cx="10029825" cy="5095875"/>
+            <a:off x="0" y="0"/>
+            <a:ext cx="12192000" cy="6858000"/>
           </a:xfrm>
           <a:prstGeom prst="rect">
             <a:avLst/>
@@ -5541,8 +6429,8 @@
         </p:blipFill>
         <p:spPr>
           <a:xfrm>
-            <a:off x="309562" y="885825"/>
-            <a:ext cx="11572875" cy="5086350"/>
+            <a:off x="0" y="0"/>
+            <a:ext cx="12192000" cy="6858000"/>
           </a:xfrm>
           <a:prstGeom prst="rect">
             <a:avLst/>

</xml_diff>